<commit_message>
Minor fix to InitialiseMapCommandSequenceDiagram
</commit_message>
<xml_diff>
--- a/docs/diagrams/InitialiseMapSequenceDiagram.pptx
+++ b/docs/diagrams/InitialiseMapSequenceDiagram.pptx
@@ -5957,8 +5957,8 @@
         </p:nvSpPr>
         <p:spPr>
           <a:xfrm>
-            <a:off x="11441863" y="4308927"/>
-            <a:ext cx="1157705" cy="184666"/>
+            <a:off x="11584582" y="4298341"/>
+            <a:ext cx="1608066" cy="184666"/>
           </a:xfrm>
           <a:prstGeom prst="rect">
             <a:avLst/>
@@ -5991,7 +5991,15 @@
             </a:r>
             <a:r>
               <a:rPr lang="en-US" sz="1200" dirty="0"/>
-              <a:t>()</a:t>
+              <a:t>(Cell[][] </a:t>
+            </a:r>
+            <a:r>
+              <a:rPr lang="en-US" sz="1200" dirty="0" err="1"/>
+              <a:t>cellGrid</a:t>
+            </a:r>
+            <a:r>
+              <a:rPr lang="en-US" sz="1200" dirty="0"/>
+              <a:t>)</a:t>
             </a:r>
           </a:p>
         </p:txBody>

</xml_diff>